<commit_message>
ajout de la diapositive improvements
</commit_message>
<xml_diff>
--- a/docs/Marking menus for android.pptx
+++ b/docs/Marking menus for android.pptx
@@ -5,7 +5,7 @@
     <p:sldMasterId id="2147483660" r:id="rId1"/>
   </p:sldMasterIdLst>
   <p:notesMasterIdLst>
-    <p:notesMasterId r:id="rId9"/>
+    <p:notesMasterId r:id="rId10"/>
   </p:notesMasterIdLst>
   <p:sldIdLst>
     <p:sldId id="256" r:id="rId2"/>
@@ -14,7 +14,8 @@
     <p:sldId id="259" r:id="rId5"/>
     <p:sldId id="260" r:id="rId6"/>
     <p:sldId id="261" r:id="rId7"/>
-    <p:sldId id="262" r:id="rId8"/>
+    <p:sldId id="263" r:id="rId8"/>
+    <p:sldId id="262" r:id="rId9"/>
   </p:sldIdLst>
   <p:sldSz cx="9144000" cy="6858000" type="screen4x3"/>
   <p:notesSz cx="6858000" cy="9144000"/>
@@ -198,7 +199,8 @@
           <a:p>
             <a:fld id="{B302D266-6CE6-48E9-9188-EDE23F405BCA}" type="datetimeFigureOut">
               <a:rPr lang="fr-FR" smtClean="0"/>
-              <a:t>20/02/2014</a:t>
+              <a:pPr/>
+              <a:t>21/02/2014</a:t>
             </a:fld>
             <a:endParaRPr lang="fr-FR"/>
           </a:p>
@@ -359,6 +361,7 @@
           <a:p>
             <a:fld id="{0E26FAC4-E258-4B44-B881-4C5499EF6203}" type="slidenum">
               <a:rPr lang="fr-FR" smtClean="0"/>
+              <a:pPr/>
               <a:t>‹N°›</a:t>
             </a:fld>
             <a:endParaRPr lang="fr-FR"/>
@@ -847,7 +850,8 @@
           <a:p>
             <a:fld id="{F6AEBF72-99FC-42C8-B45A-79DD1DA719BD}" type="datetime1">
               <a:rPr lang="fr-FR" smtClean="0"/>
-              <a:t>20/02/2014</a:t>
+              <a:pPr/>
+              <a:t>21/02/2014</a:t>
             </a:fld>
             <a:endParaRPr lang="fr-FR"/>
           </a:p>
@@ -889,6 +893,7 @@
           <a:p>
             <a:fld id="{8A4D8294-86EE-4744-B540-CA966F2190BB}" type="slidenum">
               <a:rPr lang="fr-FR" smtClean="0"/>
+              <a:pPr/>
               <a:t>‹N°›</a:t>
             </a:fld>
             <a:endParaRPr lang="fr-FR"/>
@@ -1012,7 +1017,8 @@
           <a:p>
             <a:fld id="{F9AA69B4-3CEA-45F6-A8AB-A8C9DBA473DB}" type="datetime1">
               <a:rPr lang="fr-FR" smtClean="0"/>
-              <a:t>20/02/2014</a:t>
+              <a:pPr/>
+              <a:t>21/02/2014</a:t>
             </a:fld>
             <a:endParaRPr lang="fr-FR"/>
           </a:p>
@@ -1054,6 +1060,7 @@
           <a:p>
             <a:fld id="{8A4D8294-86EE-4744-B540-CA966F2190BB}" type="slidenum">
               <a:rPr lang="fr-FR" smtClean="0"/>
+              <a:pPr/>
               <a:t>‹N°›</a:t>
             </a:fld>
             <a:endParaRPr lang="fr-FR"/>
@@ -1187,7 +1194,8 @@
           <a:p>
             <a:fld id="{6C7C3654-BC5F-4CA1-991D-2B1A426C3DDF}" type="datetime1">
               <a:rPr lang="fr-FR" smtClean="0"/>
-              <a:t>20/02/2014</a:t>
+              <a:pPr/>
+              <a:t>21/02/2014</a:t>
             </a:fld>
             <a:endParaRPr lang="fr-FR"/>
           </a:p>
@@ -1229,6 +1237,7 @@
           <a:p>
             <a:fld id="{8A4D8294-86EE-4744-B540-CA966F2190BB}" type="slidenum">
               <a:rPr lang="fr-FR" smtClean="0"/>
+              <a:pPr/>
               <a:t>‹N°›</a:t>
             </a:fld>
             <a:endParaRPr lang="fr-FR"/>
@@ -1356,7 +1365,8 @@
           <a:p>
             <a:fld id="{ECA39F2B-FD02-4756-B6A1-778EE2CAF1D6}" type="datetime1">
               <a:rPr lang="fr-FR" smtClean="0"/>
-              <a:t>20/02/2014</a:t>
+              <a:pPr/>
+              <a:t>21/02/2014</a:t>
             </a:fld>
             <a:endParaRPr lang="fr-FR"/>
           </a:p>
@@ -1398,6 +1408,7 @@
           <a:p>
             <a:fld id="{8A4D8294-86EE-4744-B540-CA966F2190BB}" type="slidenum">
               <a:rPr lang="fr-FR" smtClean="0"/>
+              <a:pPr/>
               <a:t>‹N°›</a:t>
             </a:fld>
             <a:endParaRPr lang="fr-FR"/>
@@ -1811,7 +1822,8 @@
           <a:p>
             <a:fld id="{6D9E54F0-EB27-45C0-B860-8244B23B8870}" type="datetime1">
               <a:rPr lang="fr-FR" smtClean="0"/>
-              <a:t>20/02/2014</a:t>
+              <a:pPr/>
+              <a:t>21/02/2014</a:t>
             </a:fld>
             <a:endParaRPr lang="fr-FR"/>
           </a:p>
@@ -1853,6 +1865,7 @@
           <a:p>
             <a:fld id="{8A4D8294-86EE-4744-B540-CA966F2190BB}" type="slidenum">
               <a:rPr lang="fr-FR" smtClean="0"/>
+              <a:pPr/>
               <a:t>‹N°›</a:t>
             </a:fld>
             <a:endParaRPr lang="fr-FR"/>
@@ -2075,7 +2088,8 @@
           <a:p>
             <a:fld id="{F67D3D75-032A-4981-AB36-8994276F6C01}" type="datetime1">
               <a:rPr lang="fr-FR" smtClean="0"/>
-              <a:t>20/02/2014</a:t>
+              <a:pPr/>
+              <a:t>21/02/2014</a:t>
             </a:fld>
             <a:endParaRPr lang="fr-FR"/>
           </a:p>
@@ -2117,6 +2131,7 @@
           <a:p>
             <a:fld id="{8A4D8294-86EE-4744-B540-CA966F2190BB}" type="slidenum">
               <a:rPr lang="fr-FR" smtClean="0"/>
+              <a:pPr/>
               <a:t>‹N°›</a:t>
             </a:fld>
             <a:endParaRPr lang="fr-FR"/>
@@ -2449,7 +2464,8 @@
           <a:p>
             <a:fld id="{EA20D5AA-D793-4A9A-9F26-1281DAF17AAA}" type="datetime1">
               <a:rPr lang="fr-FR" smtClean="0"/>
-              <a:t>20/02/2014</a:t>
+              <a:pPr/>
+              <a:t>21/02/2014</a:t>
             </a:fld>
             <a:endParaRPr lang="fr-FR"/>
           </a:p>
@@ -2491,6 +2507,7 @@
           <a:p>
             <a:fld id="{8A4D8294-86EE-4744-B540-CA966F2190BB}" type="slidenum">
               <a:rPr lang="fr-FR" smtClean="0"/>
+              <a:pPr/>
               <a:t>‹N°›</a:t>
             </a:fld>
             <a:endParaRPr lang="fr-FR"/>
@@ -2571,7 +2588,8 @@
           <a:p>
             <a:fld id="{DE8E1222-C4C1-4AF6-88E0-5C48A802B81B}" type="datetime1">
               <a:rPr lang="fr-FR" smtClean="0"/>
-              <a:t>20/02/2014</a:t>
+              <a:pPr/>
+              <a:t>21/02/2014</a:t>
             </a:fld>
             <a:endParaRPr lang="fr-FR"/>
           </a:p>
@@ -2594,6 +2612,7 @@
           <a:p>
             <a:fld id="{8A4D8294-86EE-4744-B540-CA966F2190BB}" type="slidenum">
               <a:rPr lang="fr-FR" smtClean="0"/>
+              <a:pPr/>
               <a:t>‹N°›</a:t>
             </a:fld>
             <a:endParaRPr lang="fr-FR"/>
@@ -2661,7 +2680,8 @@
           <a:p>
             <a:fld id="{2ED34026-8CD6-4AAC-B21E-46C21768C3F1}" type="datetime1">
               <a:rPr lang="fr-FR" smtClean="0"/>
-              <a:t>20/02/2014</a:t>
+              <a:pPr/>
+              <a:t>21/02/2014</a:t>
             </a:fld>
             <a:endParaRPr lang="fr-FR"/>
           </a:p>
@@ -2703,6 +2723,7 @@
           <a:p>
             <a:fld id="{8A4D8294-86EE-4744-B540-CA966F2190BB}" type="slidenum">
               <a:rPr lang="fr-FR" smtClean="0"/>
+              <a:pPr/>
               <a:t>‹N°›</a:t>
             </a:fld>
             <a:endParaRPr lang="fr-FR"/>
@@ -2910,7 +2931,8 @@
           <a:p>
             <a:fld id="{4D2EE766-13AE-414C-B0D0-ED941912EAF3}" type="datetime1">
               <a:rPr lang="fr-FR" smtClean="0"/>
-              <a:t>20/02/2014</a:t>
+              <a:pPr/>
+              <a:t>21/02/2014</a:t>
             </a:fld>
             <a:endParaRPr lang="fr-FR"/>
           </a:p>
@@ -2957,6 +2979,7 @@
           <a:p>
             <a:fld id="{8A4D8294-86EE-4744-B540-CA966F2190BB}" type="slidenum">
               <a:rPr lang="fr-FR" smtClean="0"/>
+              <a:pPr/>
               <a:t>‹N°›</a:t>
             </a:fld>
             <a:endParaRPr lang="fr-FR"/>
@@ -3169,7 +3192,8 @@
           <a:p>
             <a:fld id="{2786F2AA-AB0D-45E9-8F7C-5D1C15CAF90C}" type="datetime1">
               <a:rPr lang="fr-FR" smtClean="0"/>
-              <a:t>20/02/2014</a:t>
+              <a:pPr/>
+              <a:t>21/02/2014</a:t>
             </a:fld>
             <a:endParaRPr lang="fr-FR"/>
           </a:p>
@@ -3211,6 +3235,7 @@
           <a:p>
             <a:fld id="{8A4D8294-86EE-4744-B540-CA966F2190BB}" type="slidenum">
               <a:rPr lang="fr-FR" smtClean="0"/>
+              <a:pPr/>
               <a:t>‹N°›</a:t>
             </a:fld>
             <a:endParaRPr lang="fr-FR"/>
@@ -3573,7 +3598,8 @@
           <a:p>
             <a:fld id="{FC9CDBEA-BED2-4B84-8992-522694BF0F26}" type="datetime1">
               <a:rPr lang="fr-FR" smtClean="0"/>
-              <a:t>20/02/2014</a:t>
+              <a:pPr/>
+              <a:t>21/02/2014</a:t>
             </a:fld>
             <a:endParaRPr lang="fr-FR"/>
           </a:p>
@@ -3651,6 +3677,7 @@
           <a:p>
             <a:fld id="{8A4D8294-86EE-4744-B540-CA966F2190BB}" type="slidenum">
               <a:rPr lang="fr-FR" smtClean="0"/>
+              <a:pPr/>
               <a:t>‹N°›</a:t>
             </a:fld>
             <a:endParaRPr lang="fr-FR"/>
@@ -4557,6 +4584,7 @@
           <a:p>
             <a:fld id="{8A4D8294-86EE-4744-B540-CA966F2190BB}" type="slidenum">
               <a:rPr lang="fr-FR" smtClean="0"/>
+              <a:pPr/>
               <a:t>2</a:t>
             </a:fld>
             <a:endParaRPr lang="fr-FR"/>
@@ -4875,20 +4903,7 @@
                 </a:effectLst>
                 <a:latin typeface="+mj-lt"/>
               </a:rPr>
-              <a:t> </a:t>
-            </a:r>
-            <a:r>
-              <a:rPr lang="fr-FR" sz="3600" dirty="0" smtClean="0">
-                <a:effectLst>
-                  <a:outerShdw blurRad="38100" dist="38100" dir="2700000" algn="tl">
-                    <a:srgbClr val="000000">
-                      <a:alpha val="43137"/>
-                    </a:srgbClr>
-                  </a:outerShdw>
-                </a:effectLst>
-                <a:latin typeface="+mj-lt"/>
-              </a:rPr>
-              <a:t>exploration,</a:t>
+              <a:t> exploration,</a:t>
             </a:r>
           </a:p>
           <a:p>
@@ -5083,6 +5098,7 @@
           <a:p>
             <a:fld id="{8A4D8294-86EE-4744-B540-CA966F2190BB}" type="slidenum">
               <a:rPr lang="fr-FR" smtClean="0"/>
+              <a:pPr/>
               <a:t>3</a:t>
             </a:fld>
             <a:endParaRPr lang="fr-FR"/>
@@ -5285,20 +5301,7 @@
                 </a:effectLst>
                 <a:latin typeface="+mj-lt"/>
               </a:rPr>
-              <a:t>Novice </a:t>
-            </a:r>
-            <a:r>
-              <a:rPr lang="fr-FR" sz="3200" dirty="0" smtClean="0">
-                <a:effectLst>
-                  <a:outerShdw blurRad="38100" dist="38100" dir="2700000" algn="tl">
-                    <a:srgbClr val="000000">
-                      <a:alpha val="43137"/>
-                    </a:srgbClr>
-                  </a:outerShdw>
-                </a:effectLst>
-                <a:latin typeface="+mj-lt"/>
-              </a:rPr>
-              <a:t>mode</a:t>
+              <a:t>Novice mode</a:t>
             </a:r>
           </a:p>
           <a:p>
@@ -5398,6 +5401,7 @@
           <a:p>
             <a:fld id="{8A4D8294-86EE-4744-B540-CA966F2190BB}" type="slidenum">
               <a:rPr lang="fr-FR" smtClean="0"/>
+              <a:pPr/>
               <a:t>4</a:t>
             </a:fld>
             <a:endParaRPr lang="fr-FR"/>
@@ -6099,6 +6103,7 @@
           <a:p>
             <a:fld id="{8A4D8294-86EE-4744-B540-CA966F2190BB}" type="slidenum">
               <a:rPr lang="fr-FR" smtClean="0"/>
+              <a:pPr/>
               <a:t>5</a:t>
             </a:fld>
             <a:endParaRPr lang="fr-FR"/>
@@ -6854,6 +6859,7 @@
           <a:p>
             <a:fld id="{8A4D8294-86EE-4744-B540-CA966F2190BB}" type="slidenum">
               <a:rPr lang="fr-FR" smtClean="0"/>
+              <a:pPr/>
               <a:t>6</a:t>
             </a:fld>
             <a:endParaRPr lang="fr-FR"/>
@@ -6902,7 +6908,12 @@
             <p:ph type="title"/>
           </p:nvPr>
         </p:nvSpPr>
-        <p:spPr/>
+        <p:spPr>
+          <a:xfrm>
+            <a:off x="457200" y="274638"/>
+            <a:ext cx="8401080" cy="1143000"/>
+          </a:xfrm>
+        </p:spPr>
         <p:txBody>
           <a:bodyPr>
             <a:normAutofit/>
@@ -6910,7 +6921,7 @@
           <a:lstStyle/>
           <a:p>
             <a:r>
-              <a:rPr lang="fr-FR" sz="5400" b="1" cap="all" dirty="0" err="1" smtClean="0">
+              <a:rPr lang="en-US" sz="5400" b="1" cap="all" dirty="0" smtClean="0">
                 <a:ln w="5000" cmpd="sng">
                   <a:solidFill>
                     <a:srgbClr val="6EA0B0">
@@ -6964,6 +6975,262 @@
                   </a:outerShdw>
                 </a:effectLst>
               </a:rPr>
+              <a:t>Possible Improvements</a:t>
+            </a:r>
+            <a:endParaRPr lang="en-US" dirty="0"/>
+          </a:p>
+        </p:txBody>
+      </p:sp>
+      <p:sp>
+        <p:nvSpPr>
+          <p:cNvPr id="3" name="Espace réservé du contenu 2"/>
+          <p:cNvSpPr>
+            <a:spLocks noGrp="1"/>
+          </p:cNvSpPr>
+          <p:nvPr>
+            <p:ph idx="1"/>
+          </p:nvPr>
+        </p:nvSpPr>
+        <p:spPr>
+          <a:xfrm>
+            <a:off x="457200" y="1600200"/>
+            <a:ext cx="8472518" cy="4525963"/>
+          </a:xfrm>
+        </p:spPr>
+        <p:txBody>
+          <a:bodyPr>
+            <a:noAutofit/>
+          </a:bodyPr>
+          <a:lstStyle/>
+          <a:p>
+            <a:r>
+              <a:rPr lang="en-US" sz="2800" dirty="0" smtClean="0">
+                <a:effectLst>
+                  <a:outerShdw blurRad="38100" dist="38100" dir="2700000" algn="tl">
+                    <a:srgbClr val="000000">
+                      <a:alpha val="43137"/>
+                    </a:srgbClr>
+                  </a:outerShdw>
+                </a:effectLst>
+                <a:latin typeface="+mj-lt"/>
+                <a:sym typeface="Wingdings" pitchFamily="2" charset="2"/>
+              </a:rPr>
+              <a:t>Decrease sensibility,</a:t>
+            </a:r>
+          </a:p>
+          <a:p>
+            <a:r>
+              <a:rPr lang="en-US" sz="2800" dirty="0" smtClean="0">
+                <a:effectLst>
+                  <a:outerShdw blurRad="38100" dist="38100" dir="2700000" algn="tl">
+                    <a:srgbClr val="000000">
+                      <a:alpha val="43137"/>
+                    </a:srgbClr>
+                  </a:outerShdw>
+                </a:effectLst>
+                <a:latin typeface="+mj-lt"/>
+                <a:sym typeface="Wingdings" pitchFamily="2" charset="2"/>
+              </a:rPr>
+              <a:t>Increase precision,</a:t>
+            </a:r>
+          </a:p>
+          <a:p>
+            <a:r>
+              <a:rPr lang="en-US" sz="2800" dirty="0" smtClean="0">
+                <a:effectLst>
+                  <a:outerShdw blurRad="38100" dist="38100" dir="2700000" algn="tl">
+                    <a:srgbClr val="000000">
+                      <a:alpha val="43137"/>
+                    </a:srgbClr>
+                  </a:outerShdw>
+                </a:effectLst>
+                <a:latin typeface="+mj-lt"/>
+                <a:sym typeface="Wingdings" pitchFamily="2" charset="2"/>
+              </a:rPr>
+              <a:t>Enhance the recognition algorithm,</a:t>
+            </a:r>
+          </a:p>
+          <a:p>
+            <a:r>
+              <a:rPr lang="en-US" sz="2800" dirty="0" smtClean="0">
+                <a:effectLst>
+                  <a:outerShdw blurRad="38100" dist="38100" dir="2700000" algn="tl">
+                    <a:srgbClr val="000000">
+                      <a:alpha val="43137"/>
+                    </a:srgbClr>
+                  </a:outerShdw>
+                </a:effectLst>
+                <a:latin typeface="+mj-lt"/>
+                <a:sym typeface="Wingdings" pitchFamily="2" charset="2"/>
+              </a:rPr>
+              <a:t>Provide a nice looking button to switch mode when reaching a non-leaf item.</a:t>
+            </a:r>
+            <a:endParaRPr lang="en-US" sz="2800" dirty="0" smtClean="0">
+              <a:effectLst>
+                <a:outerShdw blurRad="38100" dist="38100" dir="2700000" algn="tl">
+                  <a:srgbClr val="000000">
+                    <a:alpha val="43137"/>
+                  </a:srgbClr>
+                </a:outerShdw>
+              </a:effectLst>
+              <a:latin typeface="+mj-lt"/>
+              <a:sym typeface="Wingdings" pitchFamily="2" charset="2"/>
+            </a:endParaRPr>
+          </a:p>
+        </p:txBody>
+      </p:sp>
+      <p:sp>
+        <p:nvSpPr>
+          <p:cNvPr id="4" name="Espace réservé du numéro de diapositive 3"/>
+          <p:cNvSpPr>
+            <a:spLocks noGrp="1"/>
+          </p:cNvSpPr>
+          <p:nvPr>
+            <p:ph type="sldNum" sz="quarter" idx="12"/>
+          </p:nvPr>
+        </p:nvSpPr>
+        <p:spPr/>
+        <p:txBody>
+          <a:bodyPr/>
+          <a:lstStyle/>
+          <a:p>
+            <a:fld id="{8A4D8294-86EE-4744-B540-CA966F2190BB}" type="slidenum">
+              <a:rPr lang="fr-FR" smtClean="0"/>
+              <a:pPr/>
+              <a:t>7</a:t>
+            </a:fld>
+            <a:endParaRPr lang="fr-FR"/>
+          </a:p>
+        </p:txBody>
+      </p:sp>
+      <p:pic>
+        <p:nvPicPr>
+          <p:cNvPr id="6" name="Image 5" descr="improvement.png"/>
+          <p:cNvPicPr>
+            <a:picLocks noChangeAspect="1"/>
+          </p:cNvPicPr>
+          <p:nvPr/>
+        </p:nvPicPr>
+        <p:blipFill>
+          <a:blip r:embed="rId2" cstate="print"/>
+          <a:stretch>
+            <a:fillRect/>
+          </a:stretch>
+        </p:blipFill>
+        <p:spPr>
+          <a:xfrm>
+            <a:off x="1428728" y="4214818"/>
+            <a:ext cx="6143668" cy="2866324"/>
+          </a:xfrm>
+          <a:prstGeom prst="rect">
+            <a:avLst/>
+          </a:prstGeom>
+        </p:spPr>
+      </p:pic>
+    </p:spTree>
+  </p:cSld>
+  <p:clrMapOvr>
+    <a:masterClrMapping/>
+  </p:clrMapOvr>
+  <p:timing>
+    <p:tnLst>
+      <p:par>
+        <p:cTn id="1" dur="indefinite" restart="never" nodeType="tmRoot"/>
+      </p:par>
+    </p:tnLst>
+  </p:timing>
+</p:sld>
+</file>
+
+<file path=ppt/slides/slide8.xml><?xml version="1.0" encoding="utf-8"?>
+<p:sld xmlns:a="http://schemas.openxmlformats.org/drawingml/2006/main" xmlns:r="http://schemas.openxmlformats.org/officeDocument/2006/relationships" xmlns:p="http://schemas.openxmlformats.org/presentationml/2006/main">
+  <p:cSld>
+    <p:spTree>
+      <p:nvGrpSpPr>
+        <p:cNvPr id="1" name=""/>
+        <p:cNvGrpSpPr/>
+        <p:nvPr/>
+      </p:nvGrpSpPr>
+      <p:grpSpPr>
+        <a:xfrm>
+          <a:off x="0" y="0"/>
+          <a:ext cx="0" cy="0"/>
+          <a:chOff x="0" y="0"/>
+          <a:chExt cx="0" cy="0"/>
+        </a:xfrm>
+      </p:grpSpPr>
+      <p:sp>
+        <p:nvSpPr>
+          <p:cNvPr id="2" name="Titre 1"/>
+          <p:cNvSpPr>
+            <a:spLocks noGrp="1"/>
+          </p:cNvSpPr>
+          <p:nvPr>
+            <p:ph type="title"/>
+          </p:nvPr>
+        </p:nvSpPr>
+        <p:spPr/>
+        <p:txBody>
+          <a:bodyPr>
+            <a:normAutofit/>
+          </a:bodyPr>
+          <a:lstStyle/>
+          <a:p>
+            <a:r>
+              <a:rPr lang="fr-FR" sz="5400" b="1" cap="all" dirty="0" err="1" smtClean="0">
+                <a:ln w="5000" cmpd="sng">
+                  <a:solidFill>
+                    <a:srgbClr val="6EA0B0">
+                      <a:tint val="80000"/>
+                      <a:shade val="99000"/>
+                      <a:satMod val="500000"/>
+                    </a:srgbClr>
+                  </a:solidFill>
+                  <a:prstDash val="solid"/>
+                </a:ln>
+                <a:gradFill>
+                  <a:gsLst>
+                    <a:gs pos="0">
+                      <a:srgbClr val="6EA0B0">
+                        <a:tint val="63000"/>
+                        <a:satMod val="255000"/>
+                      </a:srgbClr>
+                    </a:gs>
+                    <a:gs pos="9000">
+                      <a:srgbClr val="6EA0B0">
+                        <a:tint val="63000"/>
+                        <a:satMod val="255000"/>
+                      </a:srgbClr>
+                    </a:gs>
+                    <a:gs pos="53000">
+                      <a:srgbClr val="6EA0B0">
+                        <a:shade val="60000"/>
+                        <a:satMod val="100000"/>
+                      </a:srgbClr>
+                    </a:gs>
+                    <a:gs pos="90000">
+                      <a:srgbClr val="6EA0B0">
+                        <a:tint val="63000"/>
+                        <a:satMod val="255000"/>
+                      </a:srgbClr>
+                    </a:gs>
+                    <a:gs pos="100000">
+                      <a:srgbClr val="6EA0B0">
+                        <a:tint val="63000"/>
+                        <a:satMod val="255000"/>
+                      </a:srgbClr>
+                    </a:gs>
+                  </a:gsLst>
+                  <a:lin ang="5400000"/>
+                </a:gradFill>
+                <a:effectLst>
+                  <a:outerShdw blurRad="50800" dist="38100" dir="5400000" algn="t" rotWithShape="0">
+                    <a:prstClr val="black">
+                      <a:alpha val="50000"/>
+                    </a:prstClr>
+                  </a:outerShdw>
+                </a:effectLst>
+              </a:rPr>
               <a:t>References</a:t>
             </a:r>
             <a:endParaRPr lang="fr-FR" dirty="0"/>
@@ -7004,21 +7271,7 @@
                 <a:latin typeface="+mj-lt"/>
                 <a:hlinkClick r:id="rId2"/>
               </a:rPr>
-              <a:t>http://</a:t>
-            </a:r>
-            <a:r>
-              <a:rPr lang="fr-FR" sz="2400" dirty="0" smtClean="0">
-                <a:effectLst>
-                  <a:outerShdw blurRad="38100" dist="38100" dir="2700000" algn="tl">
-                    <a:srgbClr val="000000">
-                      <a:alpha val="43137"/>
-                    </a:srgbClr>
-                  </a:outerShdw>
-                </a:effectLst>
-                <a:latin typeface="+mj-lt"/>
-                <a:hlinkClick r:id="rId2"/>
-              </a:rPr>
-              <a:t>developer.android.com/guide/topics/ui/custom-components.html</a:t>
+              <a:t>http://developer.android.com/guide/topics/ui/custom-components.html</a:t>
             </a:r>
             <a:endParaRPr lang="fr-FR" sz="2400" dirty="0" smtClean="0">
               <a:effectLst>
@@ -7044,21 +7297,7 @@
                 <a:latin typeface="+mj-lt"/>
                 <a:hlinkClick r:id="rId3"/>
               </a:rPr>
-              <a:t>http://www.markingmenus.org</a:t>
-            </a:r>
-            <a:r>
-              <a:rPr lang="fr-FR" sz="2400" dirty="0" smtClean="0">
-                <a:effectLst>
-                  <a:outerShdw blurRad="38100" dist="38100" dir="2700000" algn="tl">
-                    <a:srgbClr val="000000">
-                      <a:alpha val="43137"/>
-                    </a:srgbClr>
-                  </a:outerShdw>
-                </a:effectLst>
-                <a:latin typeface="+mj-lt"/>
-                <a:hlinkClick r:id="rId3"/>
-              </a:rPr>
-              <a:t>/</a:t>
+              <a:t>http://www.markingmenus.org/</a:t>
             </a:r>
             <a:endParaRPr lang="fr-FR" sz="2400" dirty="0" smtClean="0">
               <a:effectLst>
@@ -7084,21 +7323,7 @@
                 <a:latin typeface="+mj-lt"/>
                 <a:hlinkClick r:id="rId4"/>
               </a:rPr>
-              <a:t>https://</a:t>
-            </a:r>
-            <a:r>
-              <a:rPr lang="fr-FR" sz="2400" dirty="0" smtClean="0">
-                <a:effectLst>
-                  <a:outerShdw blurRad="38100" dist="38100" dir="2700000" algn="tl">
-                    <a:srgbClr val="000000">
-                      <a:alpha val="43137"/>
-                    </a:srgbClr>
-                  </a:outerShdw>
-                </a:effectLst>
-                <a:latin typeface="+mj-lt"/>
-                <a:hlinkClick r:id="rId4"/>
-              </a:rPr>
-              <a:t>github.com/strider2023/Radial-Menu-Widget-Android</a:t>
+              <a:t>https://github.com/strider2023/Radial-Menu-Widget-Android</a:t>
             </a:r>
             <a:endParaRPr lang="fr-FR" sz="2400" dirty="0" smtClean="0">
               <a:effectLst>
@@ -7130,7 +7355,8 @@
           <a:p>
             <a:fld id="{8A4D8294-86EE-4744-B540-CA966F2190BB}" type="slidenum">
               <a:rPr lang="fr-FR" smtClean="0"/>
-              <a:t>7</a:t>
+              <a:pPr/>
+              <a:t>8</a:t>
             </a:fld>
             <a:endParaRPr lang="fr-FR"/>
           </a:p>

</xml_diff>